<commit_message>
Se corrigieron las referencias en la presentacion
</commit_message>
<xml_diff>
--- a/documentos/Presentacion.pptx
+++ b/documentos/Presentacion.pptx
@@ -3494,7 +3494,7 @@
                 <a:latin typeface="Arial"/>
                 <a:cs typeface="Arial"/>
               </a:rPr>
-              <a:t>[10]</a:t>
+              <a:t>[12]</a:t>
             </a:r>
           </a:p>
           <a:p>
@@ -6147,7 +6147,7 @@
         <p:spPr>
           <a:xfrm>
             <a:off x="457200" y="1219200"/>
-            <a:ext cx="8153400" cy="5416868"/>
+            <a:ext cx="8153400" cy="4924425"/>
           </a:xfrm>
           <a:prstGeom prst="rect">
             <a:avLst/>
@@ -6189,306 +6189,306 @@
           </a:p>
           <a:p>
             <a:r>
-              <a:rPr lang="es-ES" i="1" dirty="0"/>
+              <a:rPr lang="es-ES" sz="1400" i="1" dirty="0"/>
               <a:t>[1] </a:t>
             </a:r>
             <a:r>
-              <a:rPr lang="es-ES" i="1" dirty="0" err="1"/>
+              <a:rPr lang="es-ES" sz="1400" i="1" dirty="0" err="1"/>
               <a:t>Mohamad</a:t>
             </a:r>
             <a:r>
-              <a:rPr lang="es-ES" i="1" dirty="0"/>
+              <a:rPr lang="es-ES" sz="1400" i="1" dirty="0"/>
               <a:t> H. </a:t>
             </a:r>
             <a:r>
-              <a:rPr lang="es-ES" i="1" dirty="0" err="1"/>
+              <a:rPr lang="es-ES" sz="1400" i="1" dirty="0" err="1"/>
               <a:t>Hassoun</a:t>
             </a:r>
             <a:r>
-              <a:rPr lang="es-ES" i="1" dirty="0"/>
+              <a:rPr lang="es-ES" sz="1400" i="1" dirty="0"/>
               <a:t> (1995), "Fundamentals of artificial neural </a:t>
             </a:r>
             <a:r>
-              <a:rPr lang="es-ES" i="1" dirty="0" err="1"/>
+              <a:rPr lang="es-ES" sz="1400" i="1" dirty="0" err="1"/>
               <a:t>networks</a:t>
             </a:r>
             <a:r>
-              <a:rPr lang="es-ES" i="1" dirty="0"/>
+              <a:rPr lang="es-ES" sz="1400" i="1" dirty="0"/>
               <a:t>"</a:t>
             </a:r>
-            <a:endParaRPr lang="es-MX" dirty="0"/>
-          </a:p>
-          <a:p>
-            <a:r>
-              <a:rPr lang="es-ES" i="1" dirty="0"/>
+            <a:endParaRPr lang="es-MX" sz="1400" dirty="0"/>
+          </a:p>
+          <a:p>
+            <a:r>
+              <a:rPr lang="es-ES" sz="1400" i="1" dirty="0"/>
               <a:t>[2] Kevin </a:t>
             </a:r>
             <a:r>
-              <a:rPr lang="es-ES" i="1" dirty="0" err="1"/>
+              <a:rPr lang="es-ES" sz="1400" i="1" dirty="0" err="1"/>
               <a:t>Gurney</a:t>
             </a:r>
             <a:r>
-              <a:rPr lang="es-ES" i="1" dirty="0"/>
+              <a:rPr lang="es-ES" sz="1400" i="1" dirty="0"/>
               <a:t> (1997), "</a:t>
             </a:r>
             <a:r>
-              <a:rPr lang="es-ES" i="1" dirty="0" err="1"/>
+              <a:rPr lang="es-ES" sz="1400" i="1" dirty="0" err="1"/>
               <a:t>An</a:t>
             </a:r>
             <a:r>
-              <a:rPr lang="es-ES" i="1" dirty="0"/>
+              <a:rPr lang="es-ES" sz="1400" i="1" dirty="0"/>
               <a:t> </a:t>
             </a:r>
             <a:r>
-              <a:rPr lang="es-ES" i="1" dirty="0" err="1"/>
+              <a:rPr lang="es-ES" sz="1400" i="1" dirty="0" err="1"/>
               <a:t>introduction</a:t>
             </a:r>
             <a:r>
-              <a:rPr lang="es-ES" i="1" dirty="0"/>
+              <a:rPr lang="es-ES" sz="1400" i="1" dirty="0"/>
               <a:t> to neural </a:t>
             </a:r>
             <a:r>
-              <a:rPr lang="es-ES" i="1" dirty="0" err="1"/>
+              <a:rPr lang="es-ES" sz="1400" i="1" dirty="0" err="1"/>
               <a:t>networks</a:t>
             </a:r>
             <a:r>
-              <a:rPr lang="es-ES" i="1" dirty="0"/>
+              <a:rPr lang="es-ES" sz="1400" i="1" dirty="0"/>
               <a:t>"</a:t>
             </a:r>
-            <a:endParaRPr lang="es-MX" dirty="0"/>
-          </a:p>
-          <a:p>
-            <a:r>
-              <a:rPr lang="es-ES" i="1" dirty="0"/>
+            <a:endParaRPr lang="es-MX" sz="1400" dirty="0"/>
+          </a:p>
+          <a:p>
+            <a:r>
+              <a:rPr lang="es-ES" sz="1400" i="1" dirty="0"/>
               <a:t>[3] </a:t>
             </a:r>
             <a:r>
-              <a:rPr lang="es-ES" i="1" dirty="0" err="1"/>
+              <a:rPr lang="es-ES" sz="1400" i="1" dirty="0" err="1"/>
               <a:t>Silas</a:t>
             </a:r>
             <a:r>
-              <a:rPr lang="es-ES" i="1" dirty="0"/>
+              <a:rPr lang="es-ES" sz="1400" i="1" dirty="0"/>
               <a:t> Franco dos Reis Alves (2016), "Artificial Neural Networks: A </a:t>
             </a:r>
             <a:r>
-              <a:rPr lang="es-ES" i="1" dirty="0" err="1"/>
+              <a:rPr lang="es-ES" sz="1400" i="1" dirty="0" err="1"/>
               <a:t>Practical</a:t>
             </a:r>
             <a:r>
-              <a:rPr lang="es-ES" i="1" dirty="0"/>
+              <a:rPr lang="es-ES" sz="1400" i="1" dirty="0"/>
               <a:t> </a:t>
             </a:r>
             <a:r>
-              <a:rPr lang="es-ES" i="1" dirty="0" err="1"/>
+              <a:rPr lang="es-ES" sz="1400" i="1" dirty="0" err="1"/>
               <a:t>Course</a:t>
             </a:r>
             <a:r>
-              <a:rPr lang="es-ES" i="1" dirty="0"/>
+              <a:rPr lang="es-ES" sz="1400" i="1" dirty="0"/>
               <a:t>"</a:t>
             </a:r>
-            <a:endParaRPr lang="es-MX" dirty="0"/>
-          </a:p>
-          <a:p>
-            <a:r>
-              <a:rPr lang="es-ES" i="1" dirty="0"/>
+            <a:endParaRPr lang="es-MX" sz="1400" dirty="0"/>
+          </a:p>
+          <a:p>
+            <a:r>
+              <a:rPr lang="es-ES" sz="1400" i="1" dirty="0"/>
               <a:t>[4] Enric Herrera (1984), "Teoría musical y armonía moderna"</a:t>
             </a:r>
-            <a:endParaRPr lang="es-MX" dirty="0"/>
-          </a:p>
-          <a:p>
-            <a:r>
-              <a:rPr lang="es-ES" i="1" dirty="0"/>
+            <a:endParaRPr lang="es-MX" sz="1400" dirty="0"/>
+          </a:p>
+          <a:p>
+            <a:r>
+              <a:rPr lang="es-ES" sz="1400" i="1" dirty="0"/>
               <a:t>[5] Eric Taylor (1989), "</a:t>
             </a:r>
             <a:r>
-              <a:rPr lang="es-ES" i="1" dirty="0" err="1"/>
+              <a:rPr lang="es-ES" sz="1400" i="1" dirty="0" err="1"/>
               <a:t>A.B.Guide</a:t>
             </a:r>
             <a:r>
-              <a:rPr lang="es-ES" i="1" dirty="0"/>
+              <a:rPr lang="es-ES" sz="1400" i="1" dirty="0"/>
               <a:t> to Music </a:t>
             </a:r>
             <a:r>
-              <a:rPr lang="es-ES" i="1" dirty="0" err="1"/>
+              <a:rPr lang="es-ES" sz="1400" i="1" dirty="0" err="1"/>
               <a:t>Theory</a:t>
             </a:r>
             <a:r>
-              <a:rPr lang="es-ES" i="1" dirty="0"/>
+              <a:rPr lang="es-ES" sz="1400" i="1" dirty="0"/>
               <a:t>“</a:t>
             </a:r>
           </a:p>
           <a:p>
             <a:r>
-              <a:rPr lang="es-MX" i="1" dirty="0"/>
+              <a:rPr lang="es-MX" sz="1400" i="1" dirty="0"/>
               <a:t>[6] </a:t>
             </a:r>
             <a:r>
-              <a:rPr lang="en-US" i="1" dirty="0"/>
+              <a:rPr lang="en-US" sz="1400" i="1" dirty="0"/>
               <a:t>Douglas Eck and </a:t>
             </a:r>
             <a:r>
-              <a:rPr lang="en-US" i="1" dirty="0" err="1"/>
+              <a:rPr lang="en-US" sz="1400" i="1" dirty="0" err="1"/>
               <a:t>Jurgen</a:t>
             </a:r>
             <a:r>
-              <a:rPr lang="en-US" i="1" dirty="0"/>
+              <a:rPr lang="en-US" sz="1400" i="1" dirty="0"/>
               <a:t> </a:t>
             </a:r>
             <a:r>
-              <a:rPr lang="en-US" i="1" dirty="0" err="1"/>
+              <a:rPr lang="en-US" sz="1400" i="1" dirty="0" err="1"/>
               <a:t>Schmidhuber</a:t>
             </a:r>
             <a:r>
-              <a:rPr lang="en-US" i="1" dirty="0"/>
+              <a:rPr lang="en-US" sz="1400" i="1" dirty="0"/>
               <a:t> (</a:t>
             </a:r>
             <a:r>
-              <a:rPr lang="es-MX" i="1" dirty="0"/>
+              <a:rPr lang="es-MX" sz="1400" i="1" dirty="0"/>
               <a:t>2002), “</a:t>
             </a:r>
             <a:r>
-              <a:rPr lang="en-US" i="1" dirty="0"/>
+              <a:rPr lang="en-US" sz="1400" i="1" dirty="0"/>
               <a:t>A first look at music composition using </a:t>
             </a:r>
             <a:r>
-              <a:rPr lang="en-US" i="1" dirty="0" err="1"/>
+              <a:rPr lang="en-US" sz="1400" i="1" dirty="0" err="1"/>
               <a:t>lstm</a:t>
             </a:r>
             <a:r>
-              <a:rPr lang="en-US" i="1" dirty="0"/>
+              <a:rPr lang="en-US" sz="1400" i="1" dirty="0"/>
               <a:t> recurrent neural networks. Technical Report No. IDSIA-07-</a:t>
             </a:r>
             <a:r>
-              <a:rPr lang="es-MX" i="1" dirty="0"/>
+              <a:rPr lang="es-MX" sz="1400" i="1" dirty="0"/>
               <a:t>02”</a:t>
             </a:r>
             <a:r>
-              <a:rPr lang="en-US" i="1" dirty="0"/>
+              <a:rPr lang="en-US" sz="1400" i="1" dirty="0"/>
               <a:t> </a:t>
             </a:r>
-            <a:endParaRPr lang="es-MX" i="1" dirty="0"/>
-          </a:p>
-          <a:p>
-            <a:r>
-              <a:rPr lang="es-ES" i="1" dirty="0"/>
+            <a:endParaRPr lang="es-MX" sz="1400" i="1" dirty="0"/>
+          </a:p>
+          <a:p>
+            <a:r>
+              <a:rPr lang="es-ES" sz="1400" i="1" dirty="0"/>
               <a:t>[7] </a:t>
             </a:r>
             <a:r>
-              <a:rPr lang="es-ES" i="1" dirty="0" err="1"/>
+              <a:rPr lang="es-ES" sz="1400" i="1" dirty="0" err="1"/>
               <a:t>Honglak</a:t>
             </a:r>
             <a:r>
-              <a:rPr lang="es-ES" i="1" dirty="0"/>
+              <a:rPr lang="es-ES" sz="1400" i="1" dirty="0"/>
               <a:t> Lee, Yan </a:t>
             </a:r>
             <a:r>
-              <a:rPr lang="es-ES" i="1" dirty="0" err="1"/>
+              <a:rPr lang="es-ES" sz="1400" i="1" dirty="0" err="1"/>
               <a:t>Largman</a:t>
             </a:r>
             <a:r>
-              <a:rPr lang="es-ES" i="1" dirty="0"/>
+              <a:rPr lang="es-ES" sz="1400" i="1" dirty="0"/>
               <a:t>, Peter </a:t>
             </a:r>
             <a:r>
-              <a:rPr lang="es-ES" i="1" dirty="0" err="1"/>
+              <a:rPr lang="es-ES" sz="1400" i="1" dirty="0" err="1"/>
               <a:t>Pham</a:t>
             </a:r>
             <a:r>
-              <a:rPr lang="es-ES" i="1" dirty="0"/>
+              <a:rPr lang="es-ES" sz="1400" i="1" dirty="0"/>
               <a:t>, Andrew Y. </a:t>
             </a:r>
             <a:r>
-              <a:rPr lang="es-ES" i="1" dirty="0" err="1"/>
+              <a:rPr lang="es-ES" sz="1400" i="1" dirty="0" err="1"/>
               <a:t>Ng</a:t>
             </a:r>
-            <a:endParaRPr lang="es-MX" i="1" dirty="0"/>
-          </a:p>
-          <a:p>
-            <a:r>
-              <a:rPr lang="es-ES" i="1" dirty="0"/>
+            <a:endParaRPr lang="es-MX" sz="1400" i="1" dirty="0"/>
+          </a:p>
+          <a:p>
+            <a:r>
+              <a:rPr lang="es-ES" sz="1400" i="1" dirty="0"/>
               <a:t>(2009), “</a:t>
             </a:r>
             <a:r>
-              <a:rPr lang="es-ES" i="1" dirty="0" err="1"/>
+              <a:rPr lang="es-ES" sz="1400" i="1" dirty="0" err="1"/>
               <a:t>Unsupervised</a:t>
             </a:r>
             <a:r>
-              <a:rPr lang="es-ES" i="1" dirty="0"/>
+              <a:rPr lang="es-ES" sz="1400" i="1" dirty="0"/>
               <a:t> </a:t>
             </a:r>
             <a:r>
-              <a:rPr lang="es-ES" i="1" dirty="0" err="1"/>
+              <a:rPr lang="es-ES" sz="1400" i="1" dirty="0" err="1"/>
               <a:t>feature</a:t>
             </a:r>
             <a:r>
-              <a:rPr lang="es-ES" i="1" dirty="0"/>
+              <a:rPr lang="es-ES" sz="1400" i="1" dirty="0"/>
               <a:t> </a:t>
             </a:r>
             <a:r>
-              <a:rPr lang="es-ES" i="1" dirty="0" err="1"/>
+              <a:rPr lang="es-ES" sz="1400" i="1" dirty="0" err="1"/>
               <a:t>learning</a:t>
             </a:r>
             <a:r>
-              <a:rPr lang="es-ES" i="1" dirty="0"/>
+              <a:rPr lang="es-ES" sz="1400" i="1" dirty="0"/>
               <a:t> </a:t>
             </a:r>
             <a:r>
-              <a:rPr lang="es-ES" i="1" dirty="0" err="1"/>
+              <a:rPr lang="es-ES" sz="1400" i="1" dirty="0" err="1"/>
               <a:t>for</a:t>
             </a:r>
             <a:r>
-              <a:rPr lang="es-ES" i="1" dirty="0"/>
+              <a:rPr lang="es-ES" sz="1400" i="1" dirty="0"/>
               <a:t> audio </a:t>
             </a:r>
             <a:r>
-              <a:rPr lang="es-ES" i="1" dirty="0" err="1"/>
+              <a:rPr lang="es-ES" sz="1400" i="1" dirty="0" err="1"/>
               <a:t>classification</a:t>
             </a:r>
             <a:r>
-              <a:rPr lang="es-ES" i="1" dirty="0"/>
+              <a:rPr lang="es-ES" sz="1400" i="1" dirty="0"/>
               <a:t> </a:t>
             </a:r>
             <a:r>
-              <a:rPr lang="es-ES" i="1" dirty="0" err="1"/>
+              <a:rPr lang="es-ES" sz="1400" i="1" dirty="0" err="1"/>
               <a:t>using</a:t>
             </a:r>
             <a:r>
-              <a:rPr lang="es-ES" i="1" dirty="0"/>
+              <a:rPr lang="es-ES" sz="1400" i="1" dirty="0"/>
               <a:t> </a:t>
             </a:r>
             <a:r>
-              <a:rPr lang="es-ES" i="1" dirty="0" err="1"/>
+              <a:rPr lang="es-ES" sz="1400" i="1" dirty="0" err="1"/>
               <a:t>convolutional</a:t>
             </a:r>
             <a:r>
-              <a:rPr lang="es-ES" i="1" dirty="0"/>
+              <a:rPr lang="es-ES" sz="1400" i="1" dirty="0"/>
               <a:t> </a:t>
             </a:r>
             <a:r>
-              <a:rPr lang="es-ES" i="1" dirty="0" err="1"/>
+              <a:rPr lang="es-ES" sz="1400" i="1" dirty="0" err="1"/>
               <a:t>deep</a:t>
             </a:r>
             <a:r>
-              <a:rPr lang="es-ES" i="1" dirty="0"/>
+              <a:rPr lang="es-ES" sz="1400" i="1" dirty="0"/>
               <a:t> </a:t>
             </a:r>
             <a:r>
-              <a:rPr lang="es-ES" i="1" dirty="0" err="1"/>
+              <a:rPr lang="es-ES" sz="1400" i="1" dirty="0" err="1"/>
               <a:t>belief</a:t>
             </a:r>
             <a:r>
-              <a:rPr lang="es-ES" i="1" dirty="0"/>
+              <a:rPr lang="es-ES" sz="1400" i="1" dirty="0"/>
               <a:t> </a:t>
             </a:r>
             <a:r>
-              <a:rPr lang="es-ES" i="1" dirty="0" err="1"/>
+              <a:rPr lang="es-ES" sz="1400" i="1" dirty="0" err="1"/>
               <a:t>networks</a:t>
             </a:r>
             <a:r>
-              <a:rPr lang="es-ES" i="1" dirty="0"/>
+              <a:rPr lang="es-ES" sz="1400" i="1" dirty="0"/>
               <a:t>”</a:t>
             </a:r>
-            <a:endParaRPr lang="es-ES_tradnl" i="1" dirty="0">
+            <a:endParaRPr lang="es-ES_tradnl" sz="1400" i="1" dirty="0">
               <a:solidFill>
                 <a:schemeClr val="tx1">
                   <a:lumMod val="65000"/>
@@ -6500,127 +6500,163 @@
           </a:p>
           <a:p>
             <a:r>
-              <a:rPr lang="es-ES" i="1" dirty="0"/>
+              <a:rPr lang="es-ES" sz="1400" i="1" dirty="0"/>
               <a:t>[8] </a:t>
             </a:r>
             <a:r>
-              <a:rPr lang="es-ES" i="1" dirty="0" err="1"/>
-              <a:t>Aggelos</a:t>
-            </a:r>
-            <a:r>
-              <a:rPr lang="es-ES" i="1" dirty="0"/>
+              <a:rPr lang="en-US" sz="1400" dirty="0"/>
+              <a:t>E. J. Humphrey, J. P. Bello, and Y. </a:t>
+            </a:r>
+            <a:r>
+              <a:rPr lang="en-US" sz="1400" dirty="0" err="1"/>
+              <a:t>Lecun</a:t>
+            </a:r>
+            <a:r>
+              <a:rPr lang="en-US" sz="1400" dirty="0"/>
+              <a:t>, </a:t>
+            </a:r>
+            <a:r>
+              <a:rPr lang="es-ES" sz="1400" i="1" dirty="0"/>
+              <a:t>(2013), "</a:t>
+            </a:r>
+            <a:r>
+              <a:rPr lang="en-US" sz="1400" dirty="0"/>
+              <a:t>Feature learning and deep architectures: New directions for music informatics</a:t>
+            </a:r>
+            <a:r>
+              <a:rPr lang="es-ES" sz="1400" i="1" dirty="0"/>
+              <a:t>"</a:t>
+            </a:r>
+            <a:endParaRPr lang="es-MX" sz="1400" i="1" dirty="0"/>
+          </a:p>
+          <a:p>
+            <a:r>
+              <a:rPr lang="es-ES" sz="1400" i="1" dirty="0"/>
+              <a:t>[9] Allen Huang y </a:t>
+            </a:r>
+            <a:r>
+              <a:rPr lang="es-ES" sz="1400" i="1" dirty="0" err="1"/>
+              <a:t>Raymon</a:t>
+            </a:r>
+            <a:r>
+              <a:rPr lang="es-ES" sz="1400" i="1" dirty="0"/>
+              <a:t> Wu</a:t>
+            </a:r>
+            <a:r>
+              <a:rPr lang="es-MX" sz="1400" i="1" dirty="0"/>
               <a:t> </a:t>
             </a:r>
             <a:r>
-              <a:rPr lang="es-ES" i="1" dirty="0" err="1"/>
-              <a:t>Pikrakis</a:t>
-            </a:r>
-            <a:r>
-              <a:rPr lang="es-ES" i="1" dirty="0"/>
-              <a:t> (2013), "A Deep </a:t>
-            </a:r>
-            <a:r>
-              <a:rPr lang="es-ES" i="1" dirty="0" err="1"/>
+              <a:rPr lang="es-ES" sz="1400" i="1" dirty="0"/>
+              <a:t>(2016), “Deep </a:t>
+            </a:r>
+            <a:r>
+              <a:rPr lang="es-ES" sz="1400" i="1" dirty="0" err="1"/>
               <a:t>Learning</a:t>
             </a:r>
             <a:r>
-              <a:rPr lang="es-ES" i="1" dirty="0"/>
+              <a:rPr lang="es-ES" sz="1400" i="1" dirty="0"/>
               <a:t> </a:t>
             </a:r>
             <a:r>
-              <a:rPr lang="es-ES" i="1" dirty="0" err="1"/>
-              <a:t>Approach</a:t>
-            </a:r>
-            <a:r>
-              <a:rPr lang="es-ES" i="1" dirty="0"/>
-              <a:t> to </a:t>
-            </a:r>
-            <a:r>
-              <a:rPr lang="es-ES" i="1" dirty="0" err="1"/>
-              <a:t>Rhythm</a:t>
-            </a:r>
-            <a:r>
-              <a:rPr lang="es-ES" i="1" dirty="0"/>
-              <a:t> </a:t>
-            </a:r>
-            <a:r>
-              <a:rPr lang="es-ES" i="1" dirty="0" err="1"/>
-              <a:t>Modelling</a:t>
-            </a:r>
-            <a:r>
-              <a:rPr lang="es-ES" i="1" dirty="0"/>
-              <a:t> </a:t>
-            </a:r>
-            <a:r>
-              <a:rPr lang="es-ES" i="1" dirty="0" err="1"/>
-              <a:t>with</a:t>
-            </a:r>
-            <a:r>
-              <a:rPr lang="es-ES" i="1" dirty="0"/>
-              <a:t> </a:t>
-            </a:r>
-            <a:r>
-              <a:rPr lang="es-ES" i="1" dirty="0" err="1"/>
-              <a:t>Applications</a:t>
-            </a:r>
-            <a:r>
-              <a:rPr lang="es-ES" i="1" dirty="0"/>
-              <a:t>"</a:t>
-            </a:r>
-            <a:endParaRPr lang="es-MX" i="1" dirty="0"/>
-          </a:p>
-          <a:p>
-            <a:r>
-              <a:rPr lang="es-ES" i="1" dirty="0"/>
-              <a:t>[9] Allen Huang y </a:t>
-            </a:r>
-            <a:r>
-              <a:rPr lang="es-ES" i="1" dirty="0" err="1"/>
-              <a:t>Raymon</a:t>
-            </a:r>
-            <a:r>
-              <a:rPr lang="es-ES" i="1" dirty="0"/>
-              <a:t> Wu</a:t>
-            </a:r>
-            <a:r>
-              <a:rPr lang="es-MX" i="1" dirty="0"/>
-              <a:t> </a:t>
-            </a:r>
-            <a:r>
-              <a:rPr lang="es-ES" i="1" dirty="0"/>
-              <a:t>(2016), “Deep </a:t>
-            </a:r>
-            <a:r>
-              <a:rPr lang="es-ES" i="1" dirty="0" err="1"/>
-              <a:t>Learning</a:t>
-            </a:r>
-            <a:r>
-              <a:rPr lang="es-ES" i="1" dirty="0"/>
-              <a:t> </a:t>
-            </a:r>
-            <a:r>
-              <a:rPr lang="es-ES" i="1" dirty="0" err="1"/>
+              <a:rPr lang="es-ES" sz="1400" i="1" dirty="0" err="1"/>
               <a:t>for</a:t>
             </a:r>
             <a:r>
-              <a:rPr lang="es-ES" i="1" dirty="0"/>
+              <a:rPr lang="es-ES" sz="1400" i="1" dirty="0"/>
               <a:t> Music”</a:t>
             </a:r>
           </a:p>
           <a:p>
             <a:r>
-              <a:rPr lang="en-US" i="1" dirty="0"/>
-              <a:t>[10] Colin </a:t>
-            </a:r>
-            <a:r>
-              <a:rPr lang="en-US" i="1" dirty="0" err="1"/>
+              <a:rPr lang="es-ES" sz="1400" i="1" dirty="0"/>
+              <a:t>[10] </a:t>
+            </a:r>
+            <a:r>
+              <a:rPr lang="en-US" sz="1400" dirty="0"/>
+              <a:t>J. Pons, O. Nieto, M. </a:t>
+            </a:r>
+            <a:r>
+              <a:rPr lang="en-US" sz="1400" dirty="0" err="1"/>
+              <a:t>Prockup</a:t>
+            </a:r>
+            <a:r>
+              <a:rPr lang="en-US" sz="1400" dirty="0"/>
+              <a:t>, E. M. Schmidt, A. F. Ehmann, X. Serra, </a:t>
+            </a:r>
+            <a:r>
+              <a:rPr lang="es-ES" sz="1400" i="1" dirty="0"/>
+              <a:t>(2017), “</a:t>
+            </a:r>
+            <a:r>
+              <a:rPr lang="en-US" sz="1400" dirty="0"/>
+              <a:t>End-to-end learning for music audio tagging at scale</a:t>
+            </a:r>
+            <a:r>
+              <a:rPr lang="es-ES" sz="1400" i="1" dirty="0"/>
+              <a:t>”</a:t>
+            </a:r>
+          </a:p>
+          <a:p>
+            <a:r>
+              <a:rPr lang="es-ES" sz="1400" i="1" dirty="0"/>
+              <a:t>[11] </a:t>
+            </a:r>
+            <a:r>
+              <a:rPr lang="en-US" sz="1400" dirty="0"/>
+              <a:t>J. </a:t>
+            </a:r>
+            <a:r>
+              <a:rPr lang="en-US" sz="1400" dirty="0" err="1"/>
+              <a:t>Briot</a:t>
+            </a:r>
+            <a:r>
+              <a:rPr lang="en-US" sz="1400" dirty="0"/>
+              <a:t>, G. </a:t>
+            </a:r>
+            <a:r>
+              <a:rPr lang="en-US" sz="1400" dirty="0" err="1"/>
+              <a:t>Hadjeres</a:t>
+            </a:r>
+            <a:r>
+              <a:rPr lang="en-US" sz="1400" dirty="0"/>
+              <a:t>, and F. </a:t>
+            </a:r>
+            <a:r>
+              <a:rPr lang="en-US" sz="1400" dirty="0" err="1"/>
+              <a:t>Pachet</a:t>
+            </a:r>
+            <a:r>
+              <a:rPr lang="en-US" sz="1400" dirty="0"/>
+              <a:t>, </a:t>
+            </a:r>
+            <a:r>
+              <a:rPr lang="es-ES" sz="1400" i="1" dirty="0"/>
+              <a:t>(2017), “</a:t>
+            </a:r>
+            <a:r>
+              <a:rPr lang="en-US" sz="1400" dirty="0"/>
+              <a:t>Deep learning techniques for music generation - A survey</a:t>
+            </a:r>
+            <a:r>
+              <a:rPr lang="es-ES" sz="1400" i="1" dirty="0"/>
+              <a:t>”</a:t>
+            </a:r>
+          </a:p>
+          <a:p>
+            <a:r>
+              <a:rPr lang="en-US" sz="1400" i="1" dirty="0"/>
+              <a:t>[12] Colin </a:t>
+            </a:r>
+            <a:r>
+              <a:rPr lang="en-US" sz="1400" i="1" dirty="0" err="1"/>
               <a:t>Raffel</a:t>
             </a:r>
             <a:r>
-              <a:rPr lang="en-US" i="1" dirty="0"/>
+              <a:rPr lang="en-US" sz="1400" i="1" dirty="0"/>
               <a:t> (2016). "Learning-Based Methods for Comparing Sequences, with Applications to Audio-to-MIDI Alignment and Matching". PhD Thesis.</a:t>
             </a:r>
-            <a:endParaRPr lang="es-ES" i="1" dirty="0"/>
+            <a:endParaRPr lang="es-ES" sz="1400" i="1" dirty="0"/>
           </a:p>
           <a:p>
             <a:endParaRPr lang="es-MX" i="1" dirty="0"/>
@@ -7312,7 +7348,7 @@
         <p:spPr>
           <a:xfrm>
             <a:off x="457200" y="1371600"/>
-            <a:ext cx="5715000" cy="4247317"/>
+            <a:ext cx="7467600" cy="4247317"/>
           </a:xfrm>
           <a:prstGeom prst="rect">
             <a:avLst/>
@@ -7326,76 +7362,6 @@
           <a:lstStyle/>
           <a:p>
             <a:r>
-              <a:rPr lang="es-MX" b="1" dirty="0">
-                <a:latin typeface="+mj-lt"/>
-              </a:rPr>
-              <a:t>2002. “</a:t>
-            </a:r>
-            <a:r>
-              <a:rPr lang="en-US" b="1" dirty="0">
-                <a:latin typeface="+mj-lt"/>
-              </a:rPr>
-              <a:t>A first look at music composition using </a:t>
-            </a:r>
-            <a:r>
-              <a:rPr lang="en-US" b="1" dirty="0" err="1">
-                <a:latin typeface="+mj-lt"/>
-              </a:rPr>
-              <a:t>lstm</a:t>
-            </a:r>
-            <a:r>
-              <a:rPr lang="en-US" b="1" dirty="0">
-                <a:latin typeface="+mj-lt"/>
-              </a:rPr>
-              <a:t> recurrent neural networks. Technical Report No. IDSIA-07-</a:t>
-            </a:r>
-            <a:r>
-              <a:rPr lang="es-MX" b="1" dirty="0">
-                <a:latin typeface="+mj-lt"/>
-              </a:rPr>
-              <a:t>02”, Autores: </a:t>
-            </a:r>
-            <a:r>
-              <a:rPr lang="en-US" b="1" dirty="0">
-                <a:latin typeface="+mj-lt"/>
-              </a:rPr>
-              <a:t>Douglas Eck and </a:t>
-            </a:r>
-            <a:r>
-              <a:rPr lang="en-US" b="1" dirty="0" err="1">
-                <a:latin typeface="+mj-lt"/>
-              </a:rPr>
-              <a:t>Jurgen</a:t>
-            </a:r>
-            <a:r>
-              <a:rPr lang="en-US" b="1" dirty="0">
-                <a:latin typeface="+mj-lt"/>
-              </a:rPr>
-              <a:t> </a:t>
-            </a:r>
-            <a:r>
-              <a:rPr lang="en-US" b="1" dirty="0" err="1">
-                <a:latin typeface="+mj-lt"/>
-              </a:rPr>
-              <a:t>Schmidhuber</a:t>
-            </a:r>
-            <a:r>
-              <a:rPr lang="en-US" b="1" dirty="0">
-                <a:latin typeface="+mj-lt"/>
-              </a:rPr>
-              <a:t>. </a:t>
-            </a:r>
-            <a:endParaRPr lang="es-MX" b="1" dirty="0">
-              <a:latin typeface="+mj-lt"/>
-            </a:endParaRPr>
-          </a:p>
-          <a:p>
-            <a:endParaRPr lang="es-ES" b="1" dirty="0">
-              <a:latin typeface="+mj-lt"/>
-            </a:endParaRPr>
-          </a:p>
-          <a:p>
-            <a:r>
               <a:rPr lang="es-ES" b="1" dirty="0">
                 <a:latin typeface="+mj-lt"/>
               </a:rPr>
@@ -7531,19 +7497,7 @@
               <a:rPr lang="es-ES" b="1" dirty="0">
                 <a:latin typeface="+mj-lt"/>
               </a:rPr>
-              <a:t> Lee, </a:t>
-            </a:r>
-            <a:r>
-              <a:rPr lang="es-ES" b="1" dirty="0" err="1">
-                <a:latin typeface="+mj-lt"/>
-              </a:rPr>
-              <a:t>Yan</a:t>
-            </a:r>
-            <a:r>
-              <a:rPr lang="es-ES" b="1" dirty="0">
-                <a:latin typeface="+mj-lt"/>
-              </a:rPr>
-              <a:t> </a:t>
+              <a:t> Lee, Yan </a:t>
             </a:r>
             <a:r>
               <a:rPr lang="es-ES" b="1" dirty="0" err="1">
@@ -7596,99 +7550,39 @@
               <a:rPr lang="es-ES" b="1" dirty="0">
                 <a:latin typeface="+mj-lt"/>
               </a:rPr>
-              <a:t>2013, "A Deep </a:t>
-            </a:r>
-            <a:r>
-              <a:rPr lang="es-ES" b="1" dirty="0" err="1">
+              <a:t>2013, “</a:t>
+            </a:r>
+            <a:r>
+              <a:rPr lang="en-US" b="1" dirty="0">
                 <a:latin typeface="+mj-lt"/>
               </a:rPr>
-              <a:t>Learning</a:t>
-            </a:r>
-            <a:r>
-              <a:rPr lang="es-ES" b="1" dirty="0">
+              <a:t>Feature Learning and Deep Architectures: New Directions for Music Informatics”, </a:t>
+            </a:r>
+            <a:r>
+              <a:rPr lang="en-US" b="1" dirty="0" err="1">
                 <a:latin typeface="+mj-lt"/>
               </a:rPr>
-              <a:t> </a:t>
-            </a:r>
-            <a:r>
-              <a:rPr lang="es-ES" b="1" dirty="0" err="1">
+              <a:t>Autores</a:t>
+            </a:r>
+            <a:r>
+              <a:rPr lang="en-US" b="1" dirty="0">
                 <a:latin typeface="+mj-lt"/>
               </a:rPr>
-              <a:t>Approach</a:t>
-            </a:r>
-            <a:r>
-              <a:rPr lang="es-ES" b="1" dirty="0">
-                <a:latin typeface="+mj-lt"/>
-              </a:rPr>
-              <a:t> to </a:t>
-            </a:r>
-            <a:r>
-              <a:rPr lang="es-ES" b="1" dirty="0" err="1">
-                <a:latin typeface="+mj-lt"/>
-              </a:rPr>
-              <a:t>Rhythm</a:t>
-            </a:r>
-            <a:r>
-              <a:rPr lang="es-ES" b="1" dirty="0">
-                <a:latin typeface="+mj-lt"/>
-              </a:rPr>
-              <a:t> </a:t>
-            </a:r>
-            <a:r>
-              <a:rPr lang="es-ES" b="1" dirty="0" err="1">
-                <a:latin typeface="+mj-lt"/>
-              </a:rPr>
-              <a:t>Modelling</a:t>
-            </a:r>
-            <a:r>
-              <a:rPr lang="es-ES" b="1" dirty="0">
-                <a:latin typeface="+mj-lt"/>
-              </a:rPr>
-              <a:t> </a:t>
-            </a:r>
-            <a:r>
-              <a:rPr lang="es-ES" b="1" dirty="0" err="1">
-                <a:latin typeface="+mj-lt"/>
-              </a:rPr>
-              <a:t>with</a:t>
-            </a:r>
-            <a:r>
-              <a:rPr lang="es-ES" b="1" dirty="0">
-                <a:latin typeface="+mj-lt"/>
-              </a:rPr>
-              <a:t> </a:t>
-            </a:r>
-            <a:r>
-              <a:rPr lang="es-ES" b="1" dirty="0" err="1">
-                <a:latin typeface="+mj-lt"/>
-              </a:rPr>
-              <a:t>Applications</a:t>
-            </a:r>
-            <a:r>
-              <a:rPr lang="es-ES" b="1" dirty="0">
-                <a:latin typeface="+mj-lt"/>
-              </a:rPr>
-              <a:t>" Autor: </a:t>
-            </a:r>
-            <a:r>
-              <a:rPr lang="es-ES" b="1" dirty="0" err="1">
-                <a:latin typeface="+mj-lt"/>
-              </a:rPr>
-              <a:t>Aggelos</a:t>
-            </a:r>
-            <a:r>
-              <a:rPr lang="es-ES" b="1" dirty="0">
-                <a:latin typeface="+mj-lt"/>
-              </a:rPr>
-              <a:t> </a:t>
-            </a:r>
-            <a:r>
-              <a:rPr lang="es-ES" b="1" dirty="0" err="1">
-                <a:latin typeface="+mj-lt"/>
-              </a:rPr>
-              <a:t>Pikrakis</a:t>
-            </a:r>
-            <a:endParaRPr lang="es-MX" b="1" dirty="0">
+              <a:t>: </a:t>
+            </a:r>
+            <a:r>
+              <a:rPr lang="en-US" b="1" dirty="0"/>
+              <a:t>E. J. Humphrey, J. P. Bello, and Y. </a:t>
+            </a:r>
+            <a:r>
+              <a:rPr lang="en-US" b="1" dirty="0" err="1"/>
+              <a:t>Lecun</a:t>
+            </a:r>
+            <a:r>
+              <a:rPr lang="en-US" b="1" dirty="0"/>
+              <a:t>.</a:t>
+            </a:r>
+            <a:endParaRPr lang="en-US" b="1" dirty="0">
               <a:latin typeface="+mj-lt"/>
             </a:endParaRPr>
           </a:p>
@@ -7733,49 +7627,108 @@
               <a:rPr lang="es-ES" b="1" dirty="0">
                 <a:latin typeface="+mj-lt"/>
               </a:rPr>
-              <a:t> </a:t>
+              <a:t> Music”, Autores: Allen Huang y </a:t>
             </a:r>
             <a:r>
               <a:rPr lang="es-ES" b="1" dirty="0" err="1">
                 <a:latin typeface="+mj-lt"/>
               </a:rPr>
-              <a:t>Music</a:t>
+              <a:t>Raymon</a:t>
             </a:r>
             <a:r>
               <a:rPr lang="es-ES" b="1" dirty="0">
                 <a:latin typeface="+mj-lt"/>
               </a:rPr>
-              <a:t>”, Autores: Allen </a:t>
-            </a:r>
-            <a:r>
-              <a:rPr lang="es-ES" b="1" dirty="0" err="1">
-                <a:latin typeface="+mj-lt"/>
-              </a:rPr>
-              <a:t>Huang</a:t>
-            </a:r>
-            <a:r>
-              <a:rPr lang="es-ES" b="1" dirty="0">
-                <a:latin typeface="+mj-lt"/>
-              </a:rPr>
-              <a:t> y </a:t>
-            </a:r>
-            <a:r>
-              <a:rPr lang="es-ES" b="1" dirty="0" err="1">
-                <a:latin typeface="+mj-lt"/>
-              </a:rPr>
-              <a:t>Raymon</a:t>
-            </a:r>
-            <a:r>
-              <a:rPr lang="es-ES" b="1" dirty="0">
-                <a:latin typeface="+mj-lt"/>
-              </a:rPr>
-              <a:t> </a:t>
-            </a:r>
-            <a:r>
-              <a:rPr lang="es-ES" b="1" dirty="0" err="1">
-                <a:latin typeface="+mj-lt"/>
-              </a:rPr>
-              <a:t>Wu</a:t>
+              <a:t> Wu</a:t>
+            </a:r>
+          </a:p>
+          <a:p>
+            <a:endParaRPr lang="es-ES" b="1" dirty="0">
+              <a:latin typeface="+mj-lt"/>
+            </a:endParaRPr>
+          </a:p>
+          <a:p>
+            <a:r>
+              <a:rPr lang="en-US" b="1" dirty="0">
+                <a:cs typeface="Arial"/>
+              </a:rPr>
+              <a:t>2017, “End-to-end learning for music audio tagging at scale”, </a:t>
+            </a:r>
+            <a:r>
+              <a:rPr lang="en-US" b="1" dirty="0" err="1">
+                <a:cs typeface="Arial"/>
+              </a:rPr>
+              <a:t>Autores</a:t>
+            </a:r>
+            <a:r>
+              <a:rPr lang="en-US" b="1" dirty="0">
+                <a:cs typeface="Arial"/>
+              </a:rPr>
+              <a:t>: </a:t>
+            </a:r>
+            <a:r>
+              <a:rPr lang="en-US" b="1" dirty="0"/>
+              <a:t>J. Pons, O. Nieto, M. </a:t>
+            </a:r>
+            <a:r>
+              <a:rPr lang="en-US" b="1" dirty="0" err="1"/>
+              <a:t>Prockup</a:t>
+            </a:r>
+            <a:r>
+              <a:rPr lang="en-US" b="1" dirty="0"/>
+              <a:t>, E. M. Schmidt, A. F. Ehmann, X. Serra,</a:t>
+            </a:r>
+            <a:endParaRPr lang="en-US" b="1" dirty="0">
+              <a:cs typeface="Arial"/>
+            </a:endParaRPr>
+          </a:p>
+          <a:p>
+            <a:endParaRPr lang="es-ES" b="1" dirty="0">
+              <a:latin typeface="+mj-lt"/>
+            </a:endParaRPr>
+          </a:p>
+          <a:p>
+            <a:r>
+              <a:rPr lang="en-US" b="1" dirty="0"/>
+              <a:t>2017, “Deep Learning Techniques for Music Generation - A</a:t>
+            </a:r>
+          </a:p>
+          <a:p>
+            <a:r>
+              <a:rPr lang="en-US" b="1" dirty="0"/>
+              <a:t>Survey”, </a:t>
+            </a:r>
+            <a:r>
+              <a:rPr lang="en-US" b="1" dirty="0" err="1"/>
+              <a:t>Autores</a:t>
+            </a:r>
+            <a:r>
+              <a:rPr lang="en-US" b="1" dirty="0"/>
+              <a:t>: J. </a:t>
+            </a:r>
+            <a:r>
+              <a:rPr lang="en-US" b="1" dirty="0" err="1"/>
+              <a:t>Briot</a:t>
+            </a:r>
+            <a:r>
+              <a:rPr lang="en-US" b="1" dirty="0"/>
+              <a:t>, G. </a:t>
+            </a:r>
+            <a:r>
+              <a:rPr lang="en-US" b="1" dirty="0" err="1"/>
+              <a:t>Hadjeres</a:t>
+            </a:r>
+            <a:r>
+              <a:rPr lang="en-US" b="1" dirty="0"/>
+              <a:t>, F. </a:t>
+            </a:r>
+            <a:r>
+              <a:rPr lang="en-US" b="1" dirty="0" err="1"/>
+              <a:t>Pachet</a:t>
+            </a:r>
+            <a:r>
+              <a:rPr lang="en-US" b="1" dirty="0"/>
+              <a:t>.</a:t>
             </a:r>
             <a:endParaRPr lang="es-MX" b="1" dirty="0">
               <a:latin typeface="+mj-lt"/>

</xml_diff>

<commit_message>
Se realizaron correcciones a la presentacion
</commit_message>
<xml_diff>
--- a/documentos/Presentacion.pptx
+++ b/documentos/Presentacion.pptx
@@ -2427,7 +2427,7 @@
           <a:p>
             <a:pPr algn="ctr"/>
             <a:r>
-              <a:rPr lang="es-ES_tradnl" sz="2800" b="1" dirty="0">
+              <a:rPr lang="en-US" sz="2800" b="1" dirty="0" err="1">
                 <a:solidFill>
                   <a:schemeClr val="tx1">
                     <a:lumMod val="65000"/>
@@ -2437,10 +2437,10 @@
                 <a:latin typeface="Arial"/>
                 <a:cs typeface="Arial"/>
               </a:rPr>
-              <a:t>Uso de Deep </a:t>
-            </a:r>
-            <a:r>
-              <a:rPr lang="es-ES_tradnl" sz="2800" b="1" dirty="0" err="1">
+              <a:t>Composición</a:t>
+            </a:r>
+            <a:r>
+              <a:rPr lang="en-US" sz="2800" b="1" dirty="0">
                 <a:solidFill>
                   <a:schemeClr val="tx1">
                     <a:lumMod val="65000"/>
@@ -2450,10 +2450,10 @@
                 <a:latin typeface="Arial"/>
                 <a:cs typeface="Arial"/>
               </a:rPr>
-              <a:t>Learning</a:t>
-            </a:r>
-            <a:r>
-              <a:rPr lang="es-ES_tradnl" sz="2800" b="1" dirty="0">
+              <a:t> Musical </a:t>
+            </a:r>
+            <a:r>
+              <a:rPr lang="en-US" sz="2800" b="1" dirty="0" err="1">
                 <a:solidFill>
                   <a:schemeClr val="tx1">
                     <a:lumMod val="65000"/>
@@ -2463,7 +2463,20 @@
                 <a:latin typeface="Arial"/>
                 <a:cs typeface="Arial"/>
               </a:rPr>
-              <a:t> para composición musical </a:t>
+              <a:t>utilizando</a:t>
+            </a:r>
+            <a:r>
+              <a:rPr lang="en-US" sz="2800" b="1" dirty="0">
+                <a:solidFill>
+                  <a:schemeClr val="tx1">
+                    <a:lumMod val="65000"/>
+                    <a:lumOff val="35000"/>
+                  </a:schemeClr>
+                </a:solidFill>
+                <a:latin typeface="Arial"/>
+                <a:cs typeface="Arial"/>
+              </a:rPr>
+              <a:t> redes de Deep Learning Long Short Term Memory</a:t>
             </a:r>
           </a:p>
           <a:p>

</xml_diff>